<commit_message>
Finished main lectures for winter 2023/24
</commit_message>
<xml_diff>
--- a/Lecture slides/AMOS B02 - Scrum and AMOS.pptx
+++ b/Lecture slides/AMOS B02 - Scrum and AMOS.pptx
@@ -12592,7 +12592,7 @@
             <a:tbl>
               <a:tblPr>
                 <a:noFill/>
-                <a:tableStyleId>{D6387B4F-3565-4998-8DD9-34E40DD1D1DA}</a:tableStyleId>
+                <a:tableStyleId>{0576FB45-EF62-48CC-8DFD-9632D46107FF}</a:tableStyleId>
               </a:tblPr>
               <a:tblGrid>
                 <a:gridCol w="2057400"/>
@@ -14669,7 +14669,7 @@
             <a:tbl>
               <a:tblPr>
                 <a:noFill/>
-                <a:tableStyleId>{D6387B4F-3565-4998-8DD9-34E40DD1D1DA}</a:tableStyleId>
+                <a:tableStyleId>{0576FB45-EF62-48CC-8DFD-9632D46107FF}</a:tableStyleId>
               </a:tblPr>
               <a:tblGrid>
                 <a:gridCol w="638675"/>
@@ -16923,7 +16923,7 @@
             <a:tbl>
               <a:tblPr>
                 <a:noFill/>
-                <a:tableStyleId>{D6387B4F-3565-4998-8DD9-34E40DD1D1DA}</a:tableStyleId>
+                <a:tableStyleId>{0576FB45-EF62-48CC-8DFD-9632D46107FF}</a:tableStyleId>
               </a:tblPr>
               <a:tblGrid>
                 <a:gridCol w="1280725"/>
@@ -20958,6 +20958,285 @@
 </file>
 
 <file path=ppt/theme/theme1.xml><?xml version="1.0" encoding="utf-8"?>
+<a:theme xmlns:a="http://schemas.openxmlformats.org/drawingml/2006/main" xmlns:r="http://schemas.openxmlformats.org/officeDocument/2006/relationships">
+  <a:themeElements>
+    <a:clrScheme name="Default">
+      <a:dk1>
+        <a:srgbClr val="000000"/>
+      </a:dk1>
+      <a:lt1>
+        <a:srgbClr val="FFFFFF"/>
+      </a:lt1>
+      <a:dk2>
+        <a:srgbClr val="158158"/>
+      </a:dk2>
+      <a:lt2>
+        <a:srgbClr val="F3F3F3"/>
+      </a:lt2>
+      <a:accent1>
+        <a:srgbClr val="058DC7"/>
+      </a:accent1>
+      <a:accent2>
+        <a:srgbClr val="50B432"/>
+      </a:accent2>
+      <a:accent3>
+        <a:srgbClr val="ED561B"/>
+      </a:accent3>
+      <a:accent4>
+        <a:srgbClr val="EDEF00"/>
+      </a:accent4>
+      <a:accent5>
+        <a:srgbClr val="24CBE5"/>
+      </a:accent5>
+      <a:accent6>
+        <a:srgbClr val="64E572"/>
+      </a:accent6>
+      <a:hlink>
+        <a:srgbClr val="2200CC"/>
+      </a:hlink>
+      <a:folHlink>
+        <a:srgbClr val="551A8B"/>
+      </a:folHlink>
+    </a:clrScheme>
+    <a:fontScheme name="Office">
+      <a:majorFont>
+        <a:latin typeface="Arial"/>
+        <a:ea typeface=""/>
+        <a:cs typeface=""/>
+        <a:font script="Jpan" typeface="ＭＳ Ｐゴシック"/>
+        <a:font script="Hang" typeface="맑은 고딕"/>
+        <a:font script="Hans" typeface="宋体"/>
+        <a:font script="Hant" typeface="新細明體"/>
+        <a:font script="Arab" typeface="Times New Roman"/>
+        <a:font script="Hebr" typeface="Times New Roman"/>
+        <a:font script="Thai" typeface="Angsana New"/>
+        <a:font script="Ethi" typeface="Nyala"/>
+        <a:font script="Beng" typeface="Vrinda"/>
+        <a:font script="Gujr" typeface="Shruti"/>
+        <a:font script="Khmr" typeface="MoolBoran"/>
+        <a:font script="Knda" typeface="Tunga"/>
+        <a:font script="Guru" typeface="Raavi"/>
+        <a:font script="Cans" typeface="Euphemia"/>
+        <a:font script="Cher" typeface="Plantagenet Cherokee"/>
+        <a:font script="Yiii" typeface="Microsoft Yi Baiti"/>
+        <a:font script="Tibt" typeface="Microsoft Himalaya"/>
+        <a:font script="Thaa" typeface="MV Boli"/>
+        <a:font script="Deva" typeface="Mangal"/>
+        <a:font script="Telu" typeface="Gautami"/>
+        <a:font script="Taml" typeface="Latha"/>
+        <a:font script="Syrc" typeface="Estrangelo Edessa"/>
+        <a:font script="Orya" typeface="Kalinga"/>
+        <a:font script="Mlym" typeface="Kartika"/>
+        <a:font script="Laoo" typeface="DokChampa"/>
+        <a:font script="Sinh" typeface="Iskoola Pota"/>
+        <a:font script="Mong" typeface="Mongolian Baiti"/>
+        <a:font script="Viet" typeface="Times New Roman"/>
+        <a:font script="Uigh" typeface="Microsoft Uighur"/>
+        <a:font script="Geor" typeface="Sylfaen"/>
+      </a:majorFont>
+      <a:minorFont>
+        <a:latin typeface="Arial"/>
+        <a:ea typeface=""/>
+        <a:cs typeface=""/>
+        <a:font script="Jpan" typeface="ＭＳ Ｐゴシック"/>
+        <a:font script="Hang" typeface="맑은 고딕"/>
+        <a:font script="Hans" typeface="宋体"/>
+        <a:font script="Hant" typeface="新細明體"/>
+        <a:font script="Arab" typeface="Arial"/>
+        <a:font script="Hebr" typeface="Arial"/>
+        <a:font script="Thai" typeface="Cordia New"/>
+        <a:font script="Ethi" typeface="Nyala"/>
+        <a:font script="Beng" typeface="Vrinda"/>
+        <a:font script="Gujr" typeface="Shruti"/>
+        <a:font script="Khmr" typeface="DaunPenh"/>
+        <a:font script="Knda" typeface="Tunga"/>
+        <a:font script="Guru" typeface="Raavi"/>
+        <a:font script="Cans" typeface="Euphemia"/>
+        <a:font script="Cher" typeface="Plantagenet Cherokee"/>
+        <a:font script="Yiii" typeface="Microsoft Yi Baiti"/>
+        <a:font script="Tibt" typeface="Microsoft Himalaya"/>
+        <a:font script="Thaa" typeface="MV Boli"/>
+        <a:font script="Deva" typeface="Mangal"/>
+        <a:font script="Telu" typeface="Gautami"/>
+        <a:font script="Taml" typeface="Latha"/>
+        <a:font script="Syrc" typeface="Estrangelo Edessa"/>
+        <a:font script="Orya" typeface="Kalinga"/>
+        <a:font script="Mlym" typeface="Kartika"/>
+        <a:font script="Laoo" typeface="DokChampa"/>
+        <a:font script="Sinh" typeface="Iskoola Pota"/>
+        <a:font script="Mong" typeface="Mongolian Baiti"/>
+        <a:font script="Viet" typeface="Arial"/>
+        <a:font script="Uigh" typeface="Microsoft Uighur"/>
+        <a:font script="Geor" typeface="Sylfaen"/>
+      </a:minorFont>
+    </a:fontScheme>
+    <a:fmtScheme name="Office">
+      <a:fillStyleLst>
+        <a:solidFill>
+          <a:schemeClr val="phClr"/>
+        </a:solidFill>
+        <a:gradFill rotWithShape="1">
+          <a:gsLst>
+            <a:gs pos="0">
+              <a:schemeClr val="phClr">
+                <a:tint val="50000"/>
+                <a:satMod val="300000"/>
+              </a:schemeClr>
+            </a:gs>
+            <a:gs pos="35000">
+              <a:schemeClr val="phClr">
+                <a:tint val="37000"/>
+                <a:satMod val="300000"/>
+              </a:schemeClr>
+            </a:gs>
+            <a:gs pos="100000">
+              <a:schemeClr val="phClr">
+                <a:tint val="15000"/>
+                <a:satMod val="350000"/>
+              </a:schemeClr>
+            </a:gs>
+          </a:gsLst>
+          <a:lin ang="16200000" scaled="1"/>
+        </a:gradFill>
+        <a:gradFill rotWithShape="1">
+          <a:gsLst>
+            <a:gs pos="0">
+              <a:schemeClr val="phClr">
+                <a:tint val="100000"/>
+                <a:shade val="100000"/>
+                <a:satMod val="130000"/>
+              </a:schemeClr>
+            </a:gs>
+            <a:gs pos="100000">
+              <a:schemeClr val="phClr">
+                <a:tint val="50000"/>
+                <a:shade val="100000"/>
+                <a:satMod val="350000"/>
+              </a:schemeClr>
+            </a:gs>
+          </a:gsLst>
+          <a:lin ang="16200000" scaled="0"/>
+        </a:gradFill>
+      </a:fillStyleLst>
+      <a:lnStyleLst>
+        <a:ln w="9525" cap="flat" cmpd="sng" algn="ctr">
+          <a:solidFill>
+            <a:schemeClr val="phClr">
+              <a:shade val="95000"/>
+              <a:satMod val="105000"/>
+            </a:schemeClr>
+          </a:solidFill>
+          <a:prstDash val="solid"/>
+        </a:ln>
+        <a:ln w="25400" cap="flat" cmpd="sng" algn="ctr">
+          <a:solidFill>
+            <a:schemeClr val="phClr"/>
+          </a:solidFill>
+          <a:prstDash val="solid"/>
+        </a:ln>
+        <a:ln w="38100" cap="flat" cmpd="sng" algn="ctr">
+          <a:solidFill>
+            <a:schemeClr val="phClr"/>
+          </a:solidFill>
+          <a:prstDash val="solid"/>
+        </a:ln>
+      </a:lnStyleLst>
+      <a:effectStyleLst>
+        <a:effectStyle>
+          <a:effectLst>
+            <a:outerShdw blurRad="40000" dist="20000" dir="5400000" rotWithShape="0">
+              <a:srgbClr val="000000">
+                <a:alpha val="38000"/>
+              </a:srgbClr>
+            </a:outerShdw>
+          </a:effectLst>
+        </a:effectStyle>
+        <a:effectStyle>
+          <a:effectLst>
+            <a:outerShdw blurRad="40000" dist="23000" dir="5400000" rotWithShape="0">
+              <a:srgbClr val="000000">
+                <a:alpha val="35000"/>
+              </a:srgbClr>
+            </a:outerShdw>
+          </a:effectLst>
+        </a:effectStyle>
+        <a:effectStyle>
+          <a:effectLst>
+            <a:outerShdw blurRad="40000" dist="23000" dir="5400000" rotWithShape="0">
+              <a:srgbClr val="000000">
+                <a:alpha val="35000"/>
+              </a:srgbClr>
+            </a:outerShdw>
+          </a:effectLst>
+          <a:scene3d>
+            <a:camera prst="orthographicFront">
+              <a:rot lat="0" lon="0" rev="0"/>
+            </a:camera>
+            <a:lightRig rig="threePt" dir="t">
+              <a:rot lat="0" lon="0" rev="1200000"/>
+            </a:lightRig>
+          </a:scene3d>
+          <a:sp3d>
+            <a:bevelT w="63500" h="25400"/>
+          </a:sp3d>
+        </a:effectStyle>
+      </a:effectStyleLst>
+      <a:bgFillStyleLst>
+        <a:solidFill>
+          <a:schemeClr val="phClr"/>
+        </a:solidFill>
+        <a:gradFill rotWithShape="1">
+          <a:gsLst>
+            <a:gs pos="0">
+              <a:schemeClr val="phClr">
+                <a:tint val="40000"/>
+                <a:satMod val="350000"/>
+              </a:schemeClr>
+            </a:gs>
+            <a:gs pos="40000">
+              <a:schemeClr val="phClr">
+                <a:tint val="45000"/>
+                <a:shade val="99000"/>
+                <a:satMod val="350000"/>
+              </a:schemeClr>
+            </a:gs>
+            <a:gs pos="100000">
+              <a:schemeClr val="phClr">
+                <a:shade val="20000"/>
+                <a:satMod val="255000"/>
+              </a:schemeClr>
+            </a:gs>
+          </a:gsLst>
+          <a:path path="circle">
+            <a:fillToRect l="50000" t="-80000" r="50000" b="180000"/>
+          </a:path>
+        </a:gradFill>
+        <a:gradFill rotWithShape="1">
+          <a:gsLst>
+            <a:gs pos="0">
+              <a:schemeClr val="phClr">
+                <a:tint val="80000"/>
+                <a:satMod val="300000"/>
+              </a:schemeClr>
+            </a:gs>
+            <a:gs pos="100000">
+              <a:schemeClr val="phClr">
+                <a:shade val="30000"/>
+                <a:satMod val="200000"/>
+              </a:schemeClr>
+            </a:gs>
+          </a:gsLst>
+          <a:path path="circle">
+            <a:fillToRect l="50000" t="50000" r="50000" b="50000"/>
+          </a:path>
+        </a:gradFill>
+      </a:bgFillStyleLst>
+    </a:fmtScheme>
+  </a:themeElements>
+</a:theme>
+</file>
+
+<file path=ppt/theme/theme2.xml><?xml version="1.0" encoding="utf-8"?>
 <a:theme xmlns:a="http://schemas.openxmlformats.org/drawingml/2006/main" xmlns:r="http://schemas.openxmlformats.org/officeDocument/2006/relationships" name="AMOS Slides Template">
   <a:themeElements>
     <a:clrScheme name="Simple Light">
@@ -21234,283 +21513,4 @@
     </a:fmtScheme>
   </a:themeElements>
 </a:theme>
-</file>
-
-<file path=ppt/theme/theme2.xml><?xml version="1.0" encoding="utf-8"?>
-<a:theme xmlns:a="http://schemas.openxmlformats.org/drawingml/2006/main" xmlns:r="http://schemas.openxmlformats.org/officeDocument/2006/relationships">
-  <a:themeElements>
-    <a:clrScheme name="Default">
-      <a:dk1>
-        <a:srgbClr val="000000"/>
-      </a:dk1>
-      <a:lt1>
-        <a:srgbClr val="FFFFFF"/>
-      </a:lt1>
-      <a:dk2>
-        <a:srgbClr val="158158"/>
-      </a:dk2>
-      <a:lt2>
-        <a:srgbClr val="F3F3F3"/>
-      </a:lt2>
-      <a:accent1>
-        <a:srgbClr val="058DC7"/>
-      </a:accent1>
-      <a:accent2>
-        <a:srgbClr val="50B432"/>
-      </a:accent2>
-      <a:accent3>
-        <a:srgbClr val="ED561B"/>
-      </a:accent3>
-      <a:accent4>
-        <a:srgbClr val="EDEF00"/>
-      </a:accent4>
-      <a:accent5>
-        <a:srgbClr val="24CBE5"/>
-      </a:accent5>
-      <a:accent6>
-        <a:srgbClr val="64E572"/>
-      </a:accent6>
-      <a:hlink>
-        <a:srgbClr val="2200CC"/>
-      </a:hlink>
-      <a:folHlink>
-        <a:srgbClr val="551A8B"/>
-      </a:folHlink>
-    </a:clrScheme>
-    <a:fontScheme name="Office">
-      <a:majorFont>
-        <a:latin typeface="Arial"/>
-        <a:ea typeface=""/>
-        <a:cs typeface=""/>
-        <a:font script="Jpan" typeface="ＭＳ Ｐゴシック"/>
-        <a:font script="Hang" typeface="맑은 고딕"/>
-        <a:font script="Hans" typeface="宋体"/>
-        <a:font script="Hant" typeface="新細明體"/>
-        <a:font script="Arab" typeface="Times New Roman"/>
-        <a:font script="Hebr" typeface="Times New Roman"/>
-        <a:font script="Thai" typeface="Angsana New"/>
-        <a:font script="Ethi" typeface="Nyala"/>
-        <a:font script="Beng" typeface="Vrinda"/>
-        <a:font script="Gujr" typeface="Shruti"/>
-        <a:font script="Khmr" typeface="MoolBoran"/>
-        <a:font script="Knda" typeface="Tunga"/>
-        <a:font script="Guru" typeface="Raavi"/>
-        <a:font script="Cans" typeface="Euphemia"/>
-        <a:font script="Cher" typeface="Plantagenet Cherokee"/>
-        <a:font script="Yiii" typeface="Microsoft Yi Baiti"/>
-        <a:font script="Tibt" typeface="Microsoft Himalaya"/>
-        <a:font script="Thaa" typeface="MV Boli"/>
-        <a:font script="Deva" typeface="Mangal"/>
-        <a:font script="Telu" typeface="Gautami"/>
-        <a:font script="Taml" typeface="Latha"/>
-        <a:font script="Syrc" typeface="Estrangelo Edessa"/>
-        <a:font script="Orya" typeface="Kalinga"/>
-        <a:font script="Mlym" typeface="Kartika"/>
-        <a:font script="Laoo" typeface="DokChampa"/>
-        <a:font script="Sinh" typeface="Iskoola Pota"/>
-        <a:font script="Mong" typeface="Mongolian Baiti"/>
-        <a:font script="Viet" typeface="Times New Roman"/>
-        <a:font script="Uigh" typeface="Microsoft Uighur"/>
-        <a:font script="Geor" typeface="Sylfaen"/>
-      </a:majorFont>
-      <a:minorFont>
-        <a:latin typeface="Arial"/>
-        <a:ea typeface=""/>
-        <a:cs typeface=""/>
-        <a:font script="Jpan" typeface="ＭＳ Ｐゴシック"/>
-        <a:font script="Hang" typeface="맑은 고딕"/>
-        <a:font script="Hans" typeface="宋体"/>
-        <a:font script="Hant" typeface="新細明體"/>
-        <a:font script="Arab" typeface="Arial"/>
-        <a:font script="Hebr" typeface="Arial"/>
-        <a:font script="Thai" typeface="Cordia New"/>
-        <a:font script="Ethi" typeface="Nyala"/>
-        <a:font script="Beng" typeface="Vrinda"/>
-        <a:font script="Gujr" typeface="Shruti"/>
-        <a:font script="Khmr" typeface="DaunPenh"/>
-        <a:font script="Knda" typeface="Tunga"/>
-        <a:font script="Guru" typeface="Raavi"/>
-        <a:font script="Cans" typeface="Euphemia"/>
-        <a:font script="Cher" typeface="Plantagenet Cherokee"/>
-        <a:font script="Yiii" typeface="Microsoft Yi Baiti"/>
-        <a:font script="Tibt" typeface="Microsoft Himalaya"/>
-        <a:font script="Thaa" typeface="MV Boli"/>
-        <a:font script="Deva" typeface="Mangal"/>
-        <a:font script="Telu" typeface="Gautami"/>
-        <a:font script="Taml" typeface="Latha"/>
-        <a:font script="Syrc" typeface="Estrangelo Edessa"/>
-        <a:font script="Orya" typeface="Kalinga"/>
-        <a:font script="Mlym" typeface="Kartika"/>
-        <a:font script="Laoo" typeface="DokChampa"/>
-        <a:font script="Sinh" typeface="Iskoola Pota"/>
-        <a:font script="Mong" typeface="Mongolian Baiti"/>
-        <a:font script="Viet" typeface="Arial"/>
-        <a:font script="Uigh" typeface="Microsoft Uighur"/>
-        <a:font script="Geor" typeface="Sylfaen"/>
-      </a:minorFont>
-    </a:fontScheme>
-    <a:fmtScheme name="Office">
-      <a:fillStyleLst>
-        <a:solidFill>
-          <a:schemeClr val="phClr"/>
-        </a:solidFill>
-        <a:gradFill rotWithShape="1">
-          <a:gsLst>
-            <a:gs pos="0">
-              <a:schemeClr val="phClr">
-                <a:tint val="50000"/>
-                <a:satMod val="300000"/>
-              </a:schemeClr>
-            </a:gs>
-            <a:gs pos="35000">
-              <a:schemeClr val="phClr">
-                <a:tint val="37000"/>
-                <a:satMod val="300000"/>
-              </a:schemeClr>
-            </a:gs>
-            <a:gs pos="100000">
-              <a:schemeClr val="phClr">
-                <a:tint val="15000"/>
-                <a:satMod val="350000"/>
-              </a:schemeClr>
-            </a:gs>
-          </a:gsLst>
-          <a:lin ang="16200000" scaled="1"/>
-        </a:gradFill>
-        <a:gradFill rotWithShape="1">
-          <a:gsLst>
-            <a:gs pos="0">
-              <a:schemeClr val="phClr">
-                <a:tint val="100000"/>
-                <a:shade val="100000"/>
-                <a:satMod val="130000"/>
-              </a:schemeClr>
-            </a:gs>
-            <a:gs pos="100000">
-              <a:schemeClr val="phClr">
-                <a:tint val="50000"/>
-                <a:shade val="100000"/>
-                <a:satMod val="350000"/>
-              </a:schemeClr>
-            </a:gs>
-          </a:gsLst>
-          <a:lin ang="16200000" scaled="0"/>
-        </a:gradFill>
-      </a:fillStyleLst>
-      <a:lnStyleLst>
-        <a:ln w="9525" cap="flat" cmpd="sng" algn="ctr">
-          <a:solidFill>
-            <a:schemeClr val="phClr">
-              <a:shade val="95000"/>
-              <a:satMod val="105000"/>
-            </a:schemeClr>
-          </a:solidFill>
-          <a:prstDash val="solid"/>
-        </a:ln>
-        <a:ln w="25400" cap="flat" cmpd="sng" algn="ctr">
-          <a:solidFill>
-            <a:schemeClr val="phClr"/>
-          </a:solidFill>
-          <a:prstDash val="solid"/>
-        </a:ln>
-        <a:ln w="38100" cap="flat" cmpd="sng" algn="ctr">
-          <a:solidFill>
-            <a:schemeClr val="phClr"/>
-          </a:solidFill>
-          <a:prstDash val="solid"/>
-        </a:ln>
-      </a:lnStyleLst>
-      <a:effectStyleLst>
-        <a:effectStyle>
-          <a:effectLst>
-            <a:outerShdw blurRad="40000" dist="20000" dir="5400000" rotWithShape="0">
-              <a:srgbClr val="000000">
-                <a:alpha val="38000"/>
-              </a:srgbClr>
-            </a:outerShdw>
-          </a:effectLst>
-        </a:effectStyle>
-        <a:effectStyle>
-          <a:effectLst>
-            <a:outerShdw blurRad="40000" dist="23000" dir="5400000" rotWithShape="0">
-              <a:srgbClr val="000000">
-                <a:alpha val="35000"/>
-              </a:srgbClr>
-            </a:outerShdw>
-          </a:effectLst>
-        </a:effectStyle>
-        <a:effectStyle>
-          <a:effectLst>
-            <a:outerShdw blurRad="40000" dist="23000" dir="5400000" rotWithShape="0">
-              <a:srgbClr val="000000">
-                <a:alpha val="35000"/>
-              </a:srgbClr>
-            </a:outerShdw>
-          </a:effectLst>
-          <a:scene3d>
-            <a:camera prst="orthographicFront">
-              <a:rot lat="0" lon="0" rev="0"/>
-            </a:camera>
-            <a:lightRig rig="threePt" dir="t">
-              <a:rot lat="0" lon="0" rev="1200000"/>
-            </a:lightRig>
-          </a:scene3d>
-          <a:sp3d>
-            <a:bevelT w="63500" h="25400"/>
-          </a:sp3d>
-        </a:effectStyle>
-      </a:effectStyleLst>
-      <a:bgFillStyleLst>
-        <a:solidFill>
-          <a:schemeClr val="phClr"/>
-        </a:solidFill>
-        <a:gradFill rotWithShape="1">
-          <a:gsLst>
-            <a:gs pos="0">
-              <a:schemeClr val="phClr">
-                <a:tint val="40000"/>
-                <a:satMod val="350000"/>
-              </a:schemeClr>
-            </a:gs>
-            <a:gs pos="40000">
-              <a:schemeClr val="phClr">
-                <a:tint val="45000"/>
-                <a:shade val="99000"/>
-                <a:satMod val="350000"/>
-              </a:schemeClr>
-            </a:gs>
-            <a:gs pos="100000">
-              <a:schemeClr val="phClr">
-                <a:shade val="20000"/>
-                <a:satMod val="255000"/>
-              </a:schemeClr>
-            </a:gs>
-          </a:gsLst>
-          <a:path path="circle">
-            <a:fillToRect l="50000" t="-80000" r="50000" b="180000"/>
-          </a:path>
-        </a:gradFill>
-        <a:gradFill rotWithShape="1">
-          <a:gsLst>
-            <a:gs pos="0">
-              <a:schemeClr val="phClr">
-                <a:tint val="80000"/>
-                <a:satMod val="300000"/>
-              </a:schemeClr>
-            </a:gs>
-            <a:gs pos="100000">
-              <a:schemeClr val="phClr">
-                <a:shade val="30000"/>
-                <a:satMod val="200000"/>
-              </a:schemeClr>
-            </a:gs>
-          </a:gsLst>
-          <a:path path="circle">
-            <a:fillToRect l="50000" t="50000" r="50000" b="50000"/>
-          </a:path>
-        </a:gradFill>
-      </a:bgFillStyleLst>
-    </a:fmtScheme>
-  </a:themeElements>
-</a:theme>
 </file>
</xml_diff>

<commit_message>
Added B02 slides for winter 2024/25
</commit_message>
<xml_diff>
--- a/Lecture slides/AMOS B02 - Scrum and AMOS.pptx
+++ b/Lecture slides/AMOS B02 - Scrum and AMOS.pptx
@@ -1722,7 +1722,7 @@
   <p:cSld>
     <p:spTree>
       <p:nvGrpSpPr>
-        <p:cNvPr id="164" name="Shape 164"/>
+        <p:cNvPr id="165" name="Shape 165"/>
         <p:cNvGrpSpPr/>
         <p:nvPr/>
       </p:nvGrpSpPr>
@@ -1736,7 +1736,7 @@
       </p:grpSpPr>
       <p:sp>
         <p:nvSpPr>
-          <p:cNvPr id="165" name="Google Shape;165;g22c6355d619_0_207:notes"/>
+          <p:cNvPr id="166" name="Google Shape;166;g22c6355d619_0_207:notes"/>
           <p:cNvSpPr/>
           <p:nvPr>
             <p:ph idx="2" type="sldImg"/>
@@ -1771,7 +1771,7 @@
       </p:sp>
       <p:sp>
         <p:nvSpPr>
-          <p:cNvPr id="166" name="Google Shape;166;g22c6355d619_0_207:notes"/>
+          <p:cNvPr id="167" name="Google Shape;167;g22c6355d619_0_207:notes"/>
           <p:cNvSpPr txBox="1"/>
           <p:nvPr>
             <p:ph idx="1" type="body"/>
@@ -1920,7 +1920,7 @@
   <p:cSld>
     <p:spTree>
       <p:nvGrpSpPr>
-        <p:cNvPr id="171" name="Shape 171"/>
+        <p:cNvPr id="172" name="Shape 172"/>
         <p:cNvGrpSpPr/>
         <p:nvPr/>
       </p:nvGrpSpPr>
@@ -1934,7 +1934,7 @@
       </p:grpSpPr>
       <p:sp>
         <p:nvSpPr>
-          <p:cNvPr id="172" name="Google Shape;172;g22c6355d619_0_127:notes"/>
+          <p:cNvPr id="173" name="Google Shape;173;g22c6355d619_0_127:notes"/>
           <p:cNvSpPr/>
           <p:nvPr>
             <p:ph idx="2" type="sldImg"/>
@@ -1969,7 +1969,7 @@
       </p:sp>
       <p:sp>
         <p:nvSpPr>
-          <p:cNvPr id="173" name="Google Shape;173;g22c6355d619_0_127:notes"/>
+          <p:cNvPr id="174" name="Google Shape;174;g22c6355d619_0_127:notes"/>
           <p:cNvSpPr txBox="1"/>
           <p:nvPr>
             <p:ph idx="1" type="body"/>
@@ -2019,7 +2019,7 @@
   <p:cSld>
     <p:spTree>
       <p:nvGrpSpPr>
-        <p:cNvPr id="179" name="Shape 179"/>
+        <p:cNvPr id="180" name="Shape 180"/>
         <p:cNvGrpSpPr/>
         <p:nvPr/>
       </p:nvGrpSpPr>
@@ -2033,7 +2033,7 @@
       </p:grpSpPr>
       <p:sp>
         <p:nvSpPr>
-          <p:cNvPr id="180" name="Google Shape;180;g22c6355d619_0_213:notes"/>
+          <p:cNvPr id="181" name="Google Shape;181;g22c6355d619_0_213:notes"/>
           <p:cNvSpPr/>
           <p:nvPr>
             <p:ph idx="2" type="sldImg"/>
@@ -2068,7 +2068,7 @@
       </p:sp>
       <p:sp>
         <p:nvSpPr>
-          <p:cNvPr id="181" name="Google Shape;181;g22c6355d619_0_213:notes"/>
+          <p:cNvPr id="182" name="Google Shape;182;g22c6355d619_0_213:notes"/>
           <p:cNvSpPr txBox="1"/>
           <p:nvPr>
             <p:ph idx="1" type="body"/>
@@ -2118,7 +2118,7 @@
   <p:cSld>
     <p:spTree>
       <p:nvGrpSpPr>
-        <p:cNvPr id="186" name="Shape 186"/>
+        <p:cNvPr id="187" name="Shape 187"/>
         <p:cNvGrpSpPr/>
         <p:nvPr/>
       </p:nvGrpSpPr>
@@ -2132,7 +2132,7 @@
       </p:grpSpPr>
       <p:sp>
         <p:nvSpPr>
-          <p:cNvPr id="187" name="Google Shape;187;g22c6355d619_0_133:notes"/>
+          <p:cNvPr id="188" name="Google Shape;188;g22c6355d619_0_133:notes"/>
           <p:cNvSpPr/>
           <p:nvPr>
             <p:ph idx="2" type="sldImg"/>
@@ -2167,7 +2167,7 @@
       </p:sp>
       <p:sp>
         <p:nvSpPr>
-          <p:cNvPr id="188" name="Google Shape;188;g22c6355d619_0_133:notes"/>
+          <p:cNvPr id="189" name="Google Shape;189;g22c6355d619_0_133:notes"/>
           <p:cNvSpPr txBox="1"/>
           <p:nvPr>
             <p:ph idx="1" type="body"/>
@@ -2217,7 +2217,7 @@
   <p:cSld>
     <p:spTree>
       <p:nvGrpSpPr>
-        <p:cNvPr id="194" name="Shape 194"/>
+        <p:cNvPr id="195" name="Shape 195"/>
         <p:cNvGrpSpPr/>
         <p:nvPr/>
       </p:nvGrpSpPr>
@@ -2231,7 +2231,7 @@
       </p:grpSpPr>
       <p:sp>
         <p:nvSpPr>
-          <p:cNvPr id="195" name="Google Shape;195;g22c6355d619_0_219:notes"/>
+          <p:cNvPr id="196" name="Google Shape;196;g22c6355d619_0_219:notes"/>
           <p:cNvSpPr/>
           <p:nvPr>
             <p:ph idx="2" type="sldImg"/>
@@ -2266,7 +2266,7 @@
       </p:sp>
       <p:sp>
         <p:nvSpPr>
-          <p:cNvPr id="196" name="Google Shape;196;g22c6355d619_0_219:notes"/>
+          <p:cNvPr id="197" name="Google Shape;197;g22c6355d619_0_219:notes"/>
           <p:cNvSpPr txBox="1"/>
           <p:nvPr>
             <p:ph idx="1" type="body"/>
@@ -2316,7 +2316,7 @@
   <p:cSld>
     <p:spTree>
       <p:nvGrpSpPr>
-        <p:cNvPr id="201" name="Shape 201"/>
+        <p:cNvPr id="202" name="Shape 202"/>
         <p:cNvGrpSpPr/>
         <p:nvPr/>
       </p:nvGrpSpPr>
@@ -2330,7 +2330,7 @@
       </p:grpSpPr>
       <p:sp>
         <p:nvSpPr>
-          <p:cNvPr id="202" name="Google Shape;202;g22c6355d619_0_139:notes"/>
+          <p:cNvPr id="203" name="Google Shape;203;g22c6355d619_0_139:notes"/>
           <p:cNvSpPr/>
           <p:nvPr>
             <p:ph idx="2" type="sldImg"/>
@@ -2365,7 +2365,7 @@
       </p:sp>
       <p:sp>
         <p:nvSpPr>
-          <p:cNvPr id="203" name="Google Shape;203;g22c6355d619_0_139:notes"/>
+          <p:cNvPr id="204" name="Google Shape;204;g22c6355d619_0_139:notes"/>
           <p:cNvSpPr txBox="1"/>
           <p:nvPr>
             <p:ph idx="1" type="body"/>
@@ -2415,7 +2415,7 @@
   <p:cSld>
     <p:spTree>
       <p:nvGrpSpPr>
-        <p:cNvPr id="209" name="Shape 209"/>
+        <p:cNvPr id="210" name="Shape 210"/>
         <p:cNvGrpSpPr/>
         <p:nvPr/>
       </p:nvGrpSpPr>
@@ -2429,7 +2429,7 @@
       </p:grpSpPr>
       <p:sp>
         <p:nvSpPr>
-          <p:cNvPr id="210" name="Google Shape;210;g22c6355d619_0_252:notes"/>
+          <p:cNvPr id="211" name="Google Shape;211;g22c6355d619_0_252:notes"/>
           <p:cNvSpPr/>
           <p:nvPr>
             <p:ph idx="2" type="sldImg"/>
@@ -2464,7 +2464,7 @@
       </p:sp>
       <p:sp>
         <p:nvSpPr>
-          <p:cNvPr id="211" name="Google Shape;211;g22c6355d619_0_252:notes"/>
+          <p:cNvPr id="212" name="Google Shape;212;g22c6355d619_0_252:notes"/>
           <p:cNvSpPr txBox="1"/>
           <p:nvPr>
             <p:ph idx="1" type="body"/>
@@ -2514,7 +2514,7 @@
   <p:cSld>
     <p:spTree>
       <p:nvGrpSpPr>
-        <p:cNvPr id="216" name="Shape 216"/>
+        <p:cNvPr id="217" name="Shape 217"/>
         <p:cNvGrpSpPr/>
         <p:nvPr/>
       </p:nvGrpSpPr>
@@ -2528,7 +2528,7 @@
       </p:grpSpPr>
       <p:sp>
         <p:nvSpPr>
-          <p:cNvPr id="217" name="Google Shape;217;g22c6355d619_0_145:notes"/>
+          <p:cNvPr id="218" name="Google Shape;218;g22c6355d619_0_145:notes"/>
           <p:cNvSpPr/>
           <p:nvPr>
             <p:ph idx="2" type="sldImg"/>
@@ -2563,7 +2563,7 @@
       </p:sp>
       <p:sp>
         <p:nvSpPr>
-          <p:cNvPr id="218" name="Google Shape;218;g22c6355d619_0_145:notes"/>
+          <p:cNvPr id="219" name="Google Shape;219;g22c6355d619_0_145:notes"/>
           <p:cNvSpPr txBox="1"/>
           <p:nvPr>
             <p:ph idx="1" type="body"/>
@@ -2613,7 +2613,7 @@
   <p:cSld>
     <p:spTree>
       <p:nvGrpSpPr>
-        <p:cNvPr id="224" name="Shape 224"/>
+        <p:cNvPr id="225" name="Shape 225"/>
         <p:cNvGrpSpPr/>
         <p:nvPr/>
       </p:nvGrpSpPr>
@@ -2627,7 +2627,7 @@
       </p:grpSpPr>
       <p:sp>
         <p:nvSpPr>
-          <p:cNvPr id="225" name="Google Shape;225;g22c6355d619_0_152:notes"/>
+          <p:cNvPr id="226" name="Google Shape;226;g22c6355d619_0_152:notes"/>
           <p:cNvSpPr/>
           <p:nvPr>
             <p:ph idx="2" type="sldImg"/>
@@ -2662,7 +2662,7 @@
       </p:sp>
       <p:sp>
         <p:nvSpPr>
-          <p:cNvPr id="226" name="Google Shape;226;g22c6355d619_0_152:notes"/>
+          <p:cNvPr id="227" name="Google Shape;227;g22c6355d619_0_152:notes"/>
           <p:cNvSpPr txBox="1"/>
           <p:nvPr>
             <p:ph idx="1" type="body"/>
@@ -2712,7 +2712,7 @@
   <p:cSld>
     <p:spTree>
       <p:nvGrpSpPr>
-        <p:cNvPr id="232" name="Shape 232"/>
+        <p:cNvPr id="233" name="Shape 233"/>
         <p:cNvGrpSpPr/>
         <p:nvPr/>
       </p:nvGrpSpPr>
@@ -2726,7 +2726,7 @@
       </p:grpSpPr>
       <p:sp>
         <p:nvSpPr>
-          <p:cNvPr id="233" name="Google Shape;233;g22c6355d619_0_159:notes"/>
+          <p:cNvPr id="234" name="Google Shape;234;g22c6355d619_0_159:notes"/>
           <p:cNvSpPr/>
           <p:nvPr>
             <p:ph idx="2" type="sldImg"/>
@@ -2761,7 +2761,7 @@
       </p:sp>
       <p:sp>
         <p:nvSpPr>
-          <p:cNvPr id="234" name="Google Shape;234;g22c6355d619_0_159:notes"/>
+          <p:cNvPr id="235" name="Google Shape;235;g22c6355d619_0_159:notes"/>
           <p:cNvSpPr txBox="1"/>
           <p:nvPr>
             <p:ph idx="1" type="body"/>
@@ -2811,7 +2811,7 @@
   <p:cSld>
     <p:spTree>
       <p:nvGrpSpPr>
-        <p:cNvPr id="240" name="Shape 240"/>
+        <p:cNvPr id="241" name="Shape 241"/>
         <p:cNvGrpSpPr/>
         <p:nvPr/>
       </p:nvGrpSpPr>
@@ -2825,7 +2825,7 @@
       </p:grpSpPr>
       <p:sp>
         <p:nvSpPr>
-          <p:cNvPr id="241" name="Google Shape;241;g22c6355d619_0_226:notes"/>
+          <p:cNvPr id="242" name="Google Shape;242;g22c6355d619_0_226:notes"/>
           <p:cNvSpPr/>
           <p:nvPr>
             <p:ph idx="2" type="sldImg"/>
@@ -2860,7 +2860,7 @@
       </p:sp>
       <p:sp>
         <p:nvSpPr>
-          <p:cNvPr id="242" name="Google Shape;242;g22c6355d619_0_226:notes"/>
+          <p:cNvPr id="243" name="Google Shape;243;g22c6355d619_0_226:notes"/>
           <p:cNvSpPr txBox="1"/>
           <p:nvPr>
             <p:ph idx="1" type="body"/>
@@ -3009,7 +3009,7 @@
   <p:cSld>
     <p:spTree>
       <p:nvGrpSpPr>
-        <p:cNvPr id="247" name="Shape 247"/>
+        <p:cNvPr id="248" name="Shape 248"/>
         <p:cNvGrpSpPr/>
         <p:nvPr/>
       </p:nvGrpSpPr>
@@ -3023,7 +3023,7 @@
       </p:grpSpPr>
       <p:sp>
         <p:nvSpPr>
-          <p:cNvPr id="248" name="Google Shape;248;g22c6355d619_0_232:notes"/>
+          <p:cNvPr id="249" name="Google Shape;249;g22c6355d619_0_232:notes"/>
           <p:cNvSpPr/>
           <p:nvPr>
             <p:ph idx="2" type="sldImg"/>
@@ -3058,7 +3058,7 @@
       </p:sp>
       <p:sp>
         <p:nvSpPr>
-          <p:cNvPr id="249" name="Google Shape;249;g22c6355d619_0_232:notes"/>
+          <p:cNvPr id="250" name="Google Shape;250;g22c6355d619_0_232:notes"/>
           <p:cNvSpPr txBox="1"/>
           <p:nvPr>
             <p:ph idx="1" type="body"/>
@@ -3108,7 +3108,7 @@
   <p:cSld>
     <p:spTree>
       <p:nvGrpSpPr>
-        <p:cNvPr id="254" name="Shape 254"/>
+        <p:cNvPr id="255" name="Shape 255"/>
         <p:cNvGrpSpPr/>
         <p:nvPr/>
       </p:nvGrpSpPr>
@@ -3122,7 +3122,7 @@
       </p:grpSpPr>
       <p:sp>
         <p:nvSpPr>
-          <p:cNvPr id="255" name="Google Shape;255;g22c6355d619_0_165:notes"/>
+          <p:cNvPr id="256" name="Google Shape;256;g22c6355d619_0_165:notes"/>
           <p:cNvSpPr/>
           <p:nvPr>
             <p:ph idx="2" type="sldImg"/>
@@ -3157,7 +3157,7 @@
       </p:sp>
       <p:sp>
         <p:nvSpPr>
-          <p:cNvPr id="256" name="Google Shape;256;g22c6355d619_0_165:notes"/>
+          <p:cNvPr id="257" name="Google Shape;257;g22c6355d619_0_165:notes"/>
           <p:cNvSpPr txBox="1"/>
           <p:nvPr>
             <p:ph idx="1" type="body"/>
@@ -3207,7 +3207,7 @@
   <p:cSld>
     <p:spTree>
       <p:nvGrpSpPr>
-        <p:cNvPr id="261" name="Shape 261"/>
+        <p:cNvPr id="262" name="Shape 262"/>
         <p:cNvGrpSpPr/>
         <p:nvPr/>
       </p:nvGrpSpPr>
@@ -3221,7 +3221,7 @@
       </p:grpSpPr>
       <p:sp>
         <p:nvSpPr>
-          <p:cNvPr id="262" name="Google Shape;262;g22c6355d619_0_75:notes"/>
+          <p:cNvPr id="263" name="Google Shape;263;g22c6355d619_0_75:notes"/>
           <p:cNvSpPr/>
           <p:nvPr>
             <p:ph idx="2" type="sldImg"/>
@@ -3256,7 +3256,7 @@
       </p:sp>
       <p:sp>
         <p:nvSpPr>
-          <p:cNvPr id="263" name="Google Shape;263;g22c6355d619_0_75:notes"/>
+          <p:cNvPr id="264" name="Google Shape;264;g22c6355d619_0_75:notes"/>
           <p:cNvSpPr txBox="1"/>
           <p:nvPr>
             <p:ph idx="1" type="body"/>
@@ -3306,7 +3306,7 @@
   <p:cSld>
     <p:spTree>
       <p:nvGrpSpPr>
-        <p:cNvPr id="266" name="Shape 266"/>
+        <p:cNvPr id="267" name="Shape 267"/>
         <p:cNvGrpSpPr/>
         <p:nvPr/>
       </p:nvGrpSpPr>
@@ -3320,7 +3320,7 @@
       </p:grpSpPr>
       <p:sp>
         <p:nvSpPr>
-          <p:cNvPr id="267" name="Google Shape;267;g22c6355d619_0_238:notes"/>
+          <p:cNvPr id="268" name="Google Shape;268;g22c6355d619_0_238:notes"/>
           <p:cNvSpPr/>
           <p:nvPr>
             <p:ph idx="2" type="sldImg"/>
@@ -3355,7 +3355,7 @@
       </p:sp>
       <p:sp>
         <p:nvSpPr>
-          <p:cNvPr id="268" name="Google Shape;268;g22c6355d619_0_238:notes"/>
+          <p:cNvPr id="269" name="Google Shape;269;g22c6355d619_0_238:notes"/>
           <p:cNvSpPr txBox="1"/>
           <p:nvPr>
             <p:ph idx="1" type="body"/>
@@ -3405,7 +3405,7 @@
   <p:cSld>
     <p:spTree>
       <p:nvGrpSpPr>
-        <p:cNvPr id="274" name="Shape 274"/>
+        <p:cNvPr id="275" name="Shape 275"/>
         <p:cNvGrpSpPr/>
         <p:nvPr/>
       </p:nvGrpSpPr>
@@ -3419,7 +3419,7 @@
       </p:grpSpPr>
       <p:sp>
         <p:nvSpPr>
-          <p:cNvPr id="275" name="Google Shape;275;g152a3f74d0d_0_63:notes"/>
+          <p:cNvPr id="276" name="Google Shape;276;g152a3f74d0d_0_63:notes"/>
           <p:cNvSpPr/>
           <p:nvPr>
             <p:ph idx="2" type="sldImg"/>
@@ -3454,7 +3454,7 @@
       </p:sp>
       <p:sp>
         <p:nvSpPr>
-          <p:cNvPr id="276" name="Google Shape;276;g152a3f74d0d_0_63:notes"/>
+          <p:cNvPr id="277" name="Google Shape;277;g152a3f74d0d_0_63:notes"/>
           <p:cNvSpPr txBox="1"/>
           <p:nvPr>
             <p:ph idx="1" type="body"/>
@@ -3504,7 +3504,7 @@
   <p:cSld>
     <p:spTree>
       <p:nvGrpSpPr>
-        <p:cNvPr id="282" name="Shape 282"/>
+        <p:cNvPr id="283" name="Shape 283"/>
         <p:cNvGrpSpPr/>
         <p:nvPr/>
       </p:nvGrpSpPr>
@@ -3518,7 +3518,7 @@
       </p:grpSpPr>
       <p:sp>
         <p:nvSpPr>
-          <p:cNvPr id="283" name="Google Shape;283;g22c6355d619_0_244:notes"/>
+          <p:cNvPr id="284" name="Google Shape;284;g22c6355d619_0_244:notes"/>
           <p:cNvSpPr/>
           <p:nvPr>
             <p:ph idx="2" type="sldImg"/>
@@ -3553,7 +3553,7 @@
       </p:sp>
       <p:sp>
         <p:nvSpPr>
-          <p:cNvPr id="284" name="Google Shape;284;g22c6355d619_0_244:notes"/>
+          <p:cNvPr id="285" name="Google Shape;285;g22c6355d619_0_244:notes"/>
           <p:cNvSpPr txBox="1"/>
           <p:nvPr>
             <p:ph idx="1" type="body"/>
@@ -3603,7 +3603,7 @@
   <p:cSld>
     <p:spTree>
       <p:nvGrpSpPr>
-        <p:cNvPr id="289" name="Shape 289"/>
+        <p:cNvPr id="290" name="Shape 290"/>
         <p:cNvGrpSpPr/>
         <p:nvPr/>
       </p:nvGrpSpPr>
@@ -3617,7 +3617,7 @@
       </p:grpSpPr>
       <p:sp>
         <p:nvSpPr>
-          <p:cNvPr id="290" name="Google Shape;290;g152a3f74d0d_0_28:notes"/>
+          <p:cNvPr id="291" name="Google Shape;291;g152a3f74d0d_0_28:notes"/>
           <p:cNvSpPr/>
           <p:nvPr>
             <p:ph idx="2" type="sldImg"/>
@@ -3652,7 +3652,7 @@
       </p:sp>
       <p:sp>
         <p:nvSpPr>
-          <p:cNvPr id="291" name="Google Shape;291;g152a3f74d0d_0_28:notes"/>
+          <p:cNvPr id="292" name="Google Shape;292;g152a3f74d0d_0_28:notes"/>
           <p:cNvSpPr txBox="1"/>
           <p:nvPr>
             <p:ph idx="1" type="body"/>
@@ -3702,7 +3702,7 @@
   <p:cSld>
     <p:spTree>
       <p:nvGrpSpPr>
-        <p:cNvPr id="294" name="Shape 294"/>
+        <p:cNvPr id="295" name="Shape 295"/>
         <p:cNvGrpSpPr/>
         <p:nvPr/>
       </p:nvGrpSpPr>
@@ -3716,7 +3716,7 @@
       </p:grpSpPr>
       <p:sp>
         <p:nvSpPr>
-          <p:cNvPr id="295" name="Google Shape;295;g22c6355d619_0_0:notes"/>
+          <p:cNvPr id="296" name="Google Shape;296;g22c6355d619_0_0:notes"/>
           <p:cNvSpPr/>
           <p:nvPr>
             <p:ph idx="2" type="sldImg"/>
@@ -3751,7 +3751,7 @@
       </p:sp>
       <p:sp>
         <p:nvSpPr>
-          <p:cNvPr id="296" name="Google Shape;296;g22c6355d619_0_0:notes"/>
+          <p:cNvPr id="297" name="Google Shape;297;g22c6355d619_0_0:notes"/>
           <p:cNvSpPr txBox="1"/>
           <p:nvPr>
             <p:ph idx="1" type="body"/>
@@ -3801,7 +3801,7 @@
   <p:cSld>
     <p:spTree>
       <p:nvGrpSpPr>
-        <p:cNvPr id="301" name="Shape 301"/>
+        <p:cNvPr id="302" name="Shape 302"/>
         <p:cNvGrpSpPr/>
         <p:nvPr/>
       </p:nvGrpSpPr>
@@ -3815,7 +3815,7 @@
       </p:grpSpPr>
       <p:sp>
         <p:nvSpPr>
-          <p:cNvPr id="302" name="Google Shape;302;g23a7f920194_0_1:notes"/>
+          <p:cNvPr id="303" name="Google Shape;303;g23a7f920194_0_1:notes"/>
           <p:cNvSpPr/>
           <p:nvPr>
             <p:ph idx="2" type="sldImg"/>
@@ -3850,7 +3850,7 @@
       </p:sp>
       <p:sp>
         <p:nvSpPr>
-          <p:cNvPr id="303" name="Google Shape;303;g23a7f920194_0_1:notes"/>
+          <p:cNvPr id="304" name="Google Shape;304;g23a7f920194_0_1:notes"/>
           <p:cNvSpPr txBox="1"/>
           <p:nvPr>
             <p:ph idx="1" type="body"/>
@@ -3900,7 +3900,7 @@
   <p:cSld>
     <p:spTree>
       <p:nvGrpSpPr>
-        <p:cNvPr id="308" name="Shape 308"/>
+        <p:cNvPr id="309" name="Shape 309"/>
         <p:cNvGrpSpPr/>
         <p:nvPr/>
       </p:nvGrpSpPr>
@@ -3914,7 +3914,7 @@
       </p:grpSpPr>
       <p:sp>
         <p:nvSpPr>
-          <p:cNvPr id="309" name="Google Shape;309;g152a3f74d0d_0_57:notes"/>
+          <p:cNvPr id="310" name="Google Shape;310;g152a3f74d0d_0_57:notes"/>
           <p:cNvSpPr/>
           <p:nvPr>
             <p:ph idx="2" type="sldImg"/>
@@ -3949,7 +3949,7 @@
       </p:sp>
       <p:sp>
         <p:nvSpPr>
-          <p:cNvPr id="310" name="Google Shape;310;g152a3f74d0d_0_57:notes"/>
+          <p:cNvPr id="311" name="Google Shape;311;g152a3f74d0d_0_57:notes"/>
           <p:cNvSpPr txBox="1"/>
           <p:nvPr>
             <p:ph idx="1" type="body"/>
@@ -4098,7 +4098,7 @@
   <p:cSld>
     <p:spTree>
       <p:nvGrpSpPr>
-        <p:cNvPr id="315" name="Shape 315"/>
+        <p:cNvPr id="316" name="Shape 316"/>
         <p:cNvGrpSpPr/>
         <p:nvPr/>
       </p:nvGrpSpPr>
@@ -4112,7 +4112,7 @@
       </p:grpSpPr>
       <p:sp>
         <p:nvSpPr>
-          <p:cNvPr id="316" name="Google Shape;316;g22d186861df_0_1:notes"/>
+          <p:cNvPr id="317" name="Google Shape;317;g22d186861df_0_1:notes"/>
           <p:cNvSpPr/>
           <p:nvPr>
             <p:ph idx="2" type="sldImg"/>
@@ -4147,7 +4147,7 @@
       </p:sp>
       <p:sp>
         <p:nvSpPr>
-          <p:cNvPr id="317" name="Google Shape;317;g22d186861df_0_1:notes"/>
+          <p:cNvPr id="318" name="Google Shape;318;g22d186861df_0_1:notes"/>
           <p:cNvSpPr txBox="1"/>
           <p:nvPr>
             <p:ph idx="1" type="body"/>
@@ -4197,7 +4197,7 @@
   <p:cSld>
     <p:spTree>
       <p:nvGrpSpPr>
-        <p:cNvPr id="322" name="Shape 322"/>
+        <p:cNvPr id="323" name="Shape 323"/>
         <p:cNvGrpSpPr/>
         <p:nvPr/>
       </p:nvGrpSpPr>
@@ -4211,7 +4211,7 @@
       </p:grpSpPr>
       <p:sp>
         <p:nvSpPr>
-          <p:cNvPr id="323" name="Google Shape;323;g2397cb0cd5f_0_38:notes"/>
+          <p:cNvPr id="324" name="Google Shape;324;g2397cb0cd5f_0_38:notes"/>
           <p:cNvSpPr/>
           <p:nvPr>
             <p:ph idx="2" type="sldImg"/>
@@ -4246,7 +4246,7 @@
       </p:sp>
       <p:sp>
         <p:nvSpPr>
-          <p:cNvPr id="324" name="Google Shape;324;g2397cb0cd5f_0_38:notes"/>
+          <p:cNvPr id="325" name="Google Shape;325;g2397cb0cd5f_0_38:notes"/>
           <p:cNvSpPr txBox="1"/>
           <p:nvPr>
             <p:ph idx="1" type="body"/>
@@ -4296,7 +4296,7 @@
   <p:cSld>
     <p:spTree>
       <p:nvGrpSpPr>
-        <p:cNvPr id="328" name="Shape 328"/>
+        <p:cNvPr id="329" name="Shape 329"/>
         <p:cNvGrpSpPr/>
         <p:nvPr/>
       </p:nvGrpSpPr>
@@ -4310,7 +4310,7 @@
       </p:grpSpPr>
       <p:sp>
         <p:nvSpPr>
-          <p:cNvPr id="329" name="Google Shape;329;g2397cb0cd5f_0_43:notes"/>
+          <p:cNvPr id="330" name="Google Shape;330;g2397cb0cd5f_0_43:notes"/>
           <p:cNvSpPr/>
           <p:nvPr>
             <p:ph idx="2" type="sldImg"/>
@@ -4345,7 +4345,7 @@
       </p:sp>
       <p:sp>
         <p:nvSpPr>
-          <p:cNvPr id="330" name="Google Shape;330;g2397cb0cd5f_0_43:notes"/>
+          <p:cNvPr id="331" name="Google Shape;331;g2397cb0cd5f_0_43:notes"/>
           <p:cNvSpPr txBox="1"/>
           <p:nvPr>
             <p:ph idx="1" type="body"/>
@@ -8859,7 +8859,7 @@
             </a:pPr>
             <a:r>
               <a:rPr b="1" lang="en"/>
-              <a:t>Product owner</a:t>
+              <a:t>Product owner #1 [1]</a:t>
             </a:r>
             <a:endParaRPr b="1"/>
           </a:p>
@@ -8876,7 +8876,7 @@
             </a:pPr>
             <a:r>
               <a:rPr lang="en"/>
-              <a:t>Refines backlog [1] </a:t>
+              <a:t>Refines backlog [2] </a:t>
             </a:r>
             <a:r>
               <a:rPr lang="en"/>
@@ -9112,7 +9112,23 @@
             </a:pPr>
             <a:r>
               <a:rPr lang="en"/>
-              <a:t>[1] Backlog refinement is also known as backlog grooming</a:t>
+              <a:t>[1] Product owner #1 will run the sprint planning in the upcoming team meeting</a:t>
+            </a:r>
+            <a:endParaRPr/>
+          </a:p>
+          <a:p>
+            <a:pPr indent="0" lvl="0" marL="0" rtl="0" algn="l">
+              <a:spcBef>
+                <a:spcPts val="0"/>
+              </a:spcBef>
+              <a:spcAft>
+                <a:spcPts val="0"/>
+              </a:spcAft>
+              <a:buNone/>
+            </a:pPr>
+            <a:r>
+              <a:rPr lang="en"/>
+              <a:t>[2] Backlog refinement is also known as backlog grooming</a:t>
             </a:r>
             <a:endParaRPr/>
           </a:p>
@@ -10394,7 +10410,7 @@
             </a:pPr>
             <a:r>
               <a:rPr b="1" lang="en"/>
-              <a:t>Product owner</a:t>
+              <a:t>Product owner #2 [1]</a:t>
             </a:r>
             <a:endParaRPr b="1"/>
           </a:p>
@@ -10582,6 +10598,48 @@
             <a:r>
               <a:rPr lang="en"/>
               <a:t>Moves item back to product backlog</a:t>
+            </a:r>
+            <a:endParaRPr/>
+          </a:p>
+        </p:txBody>
+      </p:sp>
+      <p:sp>
+        <p:nvSpPr>
+          <p:cNvPr id="164" name="Google Shape;164;p25"/>
+          <p:cNvSpPr txBox="1"/>
+          <p:nvPr/>
+        </p:nvSpPr>
+        <p:spPr>
+          <a:xfrm>
+            <a:off x="0" y="4233672"/>
+            <a:ext cx="7315200" cy="914400"/>
+          </a:xfrm>
+          <a:prstGeom prst="rect">
+            <a:avLst/>
+          </a:prstGeom>
+          <a:noFill/>
+          <a:ln>
+            <a:noFill/>
+          </a:ln>
+        </p:spPr>
+        <p:txBody>
+          <a:bodyPr anchorCtr="0" anchor="b" bIns="91425" lIns="91425" spcFirstLastPara="1" rIns="91425" wrap="square" tIns="91425">
+            <a:noAutofit/>
+          </a:bodyPr>
+          <a:lstStyle/>
+          <a:p>
+            <a:pPr indent="0" lvl="0" marL="0" rtl="0" algn="l">
+              <a:spcBef>
+                <a:spcPts val="0"/>
+              </a:spcBef>
+              <a:spcAft>
+                <a:spcPts val="0"/>
+              </a:spcAft>
+              <a:buNone/>
+            </a:pPr>
+            <a:r>
+              <a:rPr lang="en"/>
+              <a:t>[1] Product owner #2 was responsible for the last sprint planning</a:t>
             </a:r>
             <a:endParaRPr/>
           </a:p>
@@ -10600,7 +10658,7 @@
   <p:cSld>
     <p:spTree>
       <p:nvGrpSpPr>
-        <p:cNvPr id="167" name="Shape 167"/>
+        <p:cNvPr id="168" name="Shape 168"/>
         <p:cNvGrpSpPr/>
         <p:nvPr/>
       </p:nvGrpSpPr>
@@ -10614,7 +10672,7 @@
       </p:grpSpPr>
       <p:sp>
         <p:nvSpPr>
-          <p:cNvPr id="168" name="Google Shape;168;p26"/>
+          <p:cNvPr id="169" name="Google Shape;169;p26"/>
           <p:cNvSpPr txBox="1"/>
           <p:nvPr>
             <p:ph type="title"/>
@@ -10654,7 +10712,7 @@
       </p:sp>
       <p:sp>
         <p:nvSpPr>
-          <p:cNvPr id="169" name="Google Shape;169;p26"/>
+          <p:cNvPr id="170" name="Google Shape;170;p26"/>
           <p:cNvSpPr txBox="1"/>
           <p:nvPr>
             <p:ph idx="12" type="sldNum"/>
@@ -10719,7 +10777,7 @@
       </p:sp>
       <p:sp>
         <p:nvSpPr>
-          <p:cNvPr id="170" name="Google Shape;170;p26"/>
+          <p:cNvPr id="171" name="Google Shape;171;p26"/>
           <p:cNvSpPr txBox="1"/>
           <p:nvPr>
             <p:ph idx="1" type="body"/>
@@ -11316,7 +11374,7 @@
   <p:cSld>
     <p:spTree>
       <p:nvGrpSpPr>
-        <p:cNvPr id="174" name="Shape 174"/>
+        <p:cNvPr id="175" name="Shape 175"/>
         <p:cNvGrpSpPr/>
         <p:nvPr/>
       </p:nvGrpSpPr>
@@ -11330,7 +11388,7 @@
       </p:grpSpPr>
       <p:sp>
         <p:nvSpPr>
-          <p:cNvPr id="175" name="Google Shape;175;p27"/>
+          <p:cNvPr id="176" name="Google Shape;176;p27"/>
           <p:cNvSpPr txBox="1"/>
           <p:nvPr>
             <p:ph type="title"/>
@@ -11370,7 +11428,7 @@
       </p:sp>
       <p:sp>
         <p:nvSpPr>
-          <p:cNvPr id="176" name="Google Shape;176;p27"/>
+          <p:cNvPr id="177" name="Google Shape;177;p27"/>
           <p:cNvSpPr txBox="1"/>
           <p:nvPr>
             <p:ph idx="1" type="body"/>
@@ -11402,7 +11460,7 @@
             </a:pPr>
             <a:r>
               <a:rPr b="1" lang="en"/>
-              <a:t>Product owner</a:t>
+              <a:t>Product owner #2</a:t>
             </a:r>
             <a:endParaRPr b="1"/>
           </a:p>
@@ -11510,7 +11568,7 @@
       </p:sp>
       <p:sp>
         <p:nvSpPr>
-          <p:cNvPr id="177" name="Google Shape;177;p27"/>
+          <p:cNvPr id="178" name="Google Shape;178;p27"/>
           <p:cNvSpPr txBox="1"/>
           <p:nvPr>
             <p:ph idx="12" type="sldNum"/>
@@ -11575,7 +11633,7 @@
       </p:sp>
       <p:pic>
         <p:nvPicPr>
-          <p:cNvPr id="178" name="Google Shape;178;p27"/>
+          <p:cNvPr id="179" name="Google Shape;179;p27"/>
           <p:cNvPicPr preferRelativeResize="0"/>
           <p:nvPr/>
         </p:nvPicPr>
@@ -11614,7 +11672,7 @@
   <p:cSld>
     <p:spTree>
       <p:nvGrpSpPr>
-        <p:cNvPr id="182" name="Shape 182"/>
+        <p:cNvPr id="183" name="Shape 183"/>
         <p:cNvGrpSpPr/>
         <p:nvPr/>
       </p:nvGrpSpPr>
@@ -11628,7 +11686,7 @@
       </p:grpSpPr>
       <p:sp>
         <p:nvSpPr>
-          <p:cNvPr id="183" name="Google Shape;183;p28"/>
+          <p:cNvPr id="184" name="Google Shape;184;p28"/>
           <p:cNvSpPr txBox="1"/>
           <p:nvPr>
             <p:ph type="title"/>
@@ -11668,7 +11726,7 @@
       </p:sp>
       <p:sp>
         <p:nvSpPr>
-          <p:cNvPr id="184" name="Google Shape;184;p28"/>
+          <p:cNvPr id="185" name="Google Shape;185;p28"/>
           <p:cNvSpPr txBox="1"/>
           <p:nvPr>
             <p:ph idx="1" type="body"/>
@@ -11801,7 +11859,7 @@
       </p:sp>
       <p:sp>
         <p:nvSpPr>
-          <p:cNvPr id="185" name="Google Shape;185;p28"/>
+          <p:cNvPr id="186" name="Google Shape;186;p28"/>
           <p:cNvSpPr txBox="1"/>
           <p:nvPr>
             <p:ph idx="12" type="sldNum"/>
@@ -11877,7 +11935,7 @@
   <p:cSld>
     <p:spTree>
       <p:nvGrpSpPr>
-        <p:cNvPr id="189" name="Shape 189"/>
+        <p:cNvPr id="190" name="Shape 190"/>
         <p:cNvGrpSpPr/>
         <p:nvPr/>
       </p:nvGrpSpPr>
@@ -11891,7 +11949,7 @@
       </p:grpSpPr>
       <p:sp>
         <p:nvSpPr>
-          <p:cNvPr id="190" name="Google Shape;190;p29"/>
+          <p:cNvPr id="191" name="Google Shape;191;p29"/>
           <p:cNvSpPr txBox="1"/>
           <p:nvPr>
             <p:ph type="title"/>
@@ -11931,7 +11989,7 @@
       </p:sp>
       <p:sp>
         <p:nvSpPr>
-          <p:cNvPr id="191" name="Google Shape;191;p29"/>
+          <p:cNvPr id="192" name="Google Shape;192;p29"/>
           <p:cNvSpPr txBox="1"/>
           <p:nvPr>
             <p:ph idx="1" type="body"/>
@@ -12122,7 +12180,7 @@
       </p:sp>
       <p:sp>
         <p:nvSpPr>
-          <p:cNvPr id="192" name="Google Shape;192;p29"/>
+          <p:cNvPr id="193" name="Google Shape;193;p29"/>
           <p:cNvSpPr txBox="1"/>
           <p:nvPr>
             <p:ph idx="12" type="sldNum"/>
@@ -12187,7 +12245,7 @@
       </p:sp>
       <p:pic>
         <p:nvPicPr>
-          <p:cNvPr id="193" name="Google Shape;193;p29"/>
+          <p:cNvPr id="194" name="Google Shape;194;p29"/>
           <p:cNvPicPr preferRelativeResize="0"/>
           <p:nvPr/>
         </p:nvPicPr>
@@ -12226,7 +12284,7 @@
   <p:cSld>
     <p:spTree>
       <p:nvGrpSpPr>
-        <p:cNvPr id="197" name="Shape 197"/>
+        <p:cNvPr id="198" name="Shape 198"/>
         <p:cNvGrpSpPr/>
         <p:nvPr/>
       </p:nvGrpSpPr>
@@ -12240,7 +12298,7 @@
       </p:grpSpPr>
       <p:sp>
         <p:nvSpPr>
-          <p:cNvPr id="198" name="Google Shape;198;p30"/>
+          <p:cNvPr id="199" name="Google Shape;199;p30"/>
           <p:cNvSpPr txBox="1"/>
           <p:nvPr>
             <p:ph type="title"/>
@@ -12280,7 +12338,7 @@
       </p:sp>
       <p:sp>
         <p:nvSpPr>
-          <p:cNvPr id="199" name="Google Shape;199;p30"/>
+          <p:cNvPr id="200" name="Google Shape;200;p30"/>
           <p:cNvSpPr txBox="1"/>
           <p:nvPr>
             <p:ph idx="1" type="body"/>
@@ -12337,7 +12395,7 @@
       </p:sp>
       <p:sp>
         <p:nvSpPr>
-          <p:cNvPr id="200" name="Google Shape;200;p30"/>
+          <p:cNvPr id="201" name="Google Shape;201;p30"/>
           <p:cNvSpPr txBox="1"/>
           <p:nvPr>
             <p:ph idx="12" type="sldNum"/>
@@ -12413,7 +12471,7 @@
   <p:cSld>
     <p:spTree>
       <p:nvGrpSpPr>
-        <p:cNvPr id="204" name="Shape 204"/>
+        <p:cNvPr id="205" name="Shape 205"/>
         <p:cNvGrpSpPr/>
         <p:nvPr/>
       </p:nvGrpSpPr>
@@ -12427,7 +12485,7 @@
       </p:grpSpPr>
       <p:sp>
         <p:nvSpPr>
-          <p:cNvPr id="205" name="Google Shape;205;p31"/>
+          <p:cNvPr id="206" name="Google Shape;206;p31"/>
           <p:cNvSpPr txBox="1"/>
           <p:nvPr>
             <p:ph type="title"/>
@@ -12467,7 +12525,7 @@
       </p:sp>
       <p:sp>
         <p:nvSpPr>
-          <p:cNvPr id="206" name="Google Shape;206;p31"/>
+          <p:cNvPr id="207" name="Google Shape;207;p31"/>
           <p:cNvSpPr txBox="1"/>
           <p:nvPr>
             <p:ph idx="12" type="sldNum"/>
@@ -12532,7 +12590,7 @@
       </p:sp>
       <p:sp>
         <p:nvSpPr>
-          <p:cNvPr id="207" name="Google Shape;207;p31"/>
+          <p:cNvPr id="208" name="Google Shape;208;p31"/>
           <p:cNvSpPr txBox="1"/>
           <p:nvPr>
             <p:ph idx="1" type="body"/>
@@ -12569,7 +12627,7 @@
             </a:pPr>
             <a:r>
               <a:rPr b="1" lang="en"/>
-              <a:t>Product owner</a:t>
+              <a:t>Product owner #1</a:t>
             </a:r>
             <a:endParaRPr b="1"/>
           </a:p>
@@ -12679,7 +12737,7 @@
       </p:sp>
       <p:pic>
         <p:nvPicPr>
-          <p:cNvPr id="208" name="Google Shape;208;p31"/>
+          <p:cNvPr id="209" name="Google Shape;209;p31"/>
           <p:cNvPicPr preferRelativeResize="0"/>
           <p:nvPr/>
         </p:nvPicPr>
@@ -12718,7 +12776,7 @@
   <p:cSld>
     <p:spTree>
       <p:nvGrpSpPr>
-        <p:cNvPr id="212" name="Shape 212"/>
+        <p:cNvPr id="213" name="Shape 213"/>
         <p:cNvGrpSpPr/>
         <p:nvPr/>
       </p:nvGrpSpPr>
@@ -12732,7 +12790,7 @@
       </p:grpSpPr>
       <p:sp>
         <p:nvSpPr>
-          <p:cNvPr id="213" name="Google Shape;213;p32"/>
+          <p:cNvPr id="214" name="Google Shape;214;p32"/>
           <p:cNvSpPr txBox="1"/>
           <p:nvPr>
             <p:ph type="title"/>
@@ -12772,7 +12830,7 @@
       </p:sp>
       <p:sp>
         <p:nvSpPr>
-          <p:cNvPr id="214" name="Google Shape;214;p32"/>
+          <p:cNvPr id="215" name="Google Shape;215;p32"/>
           <p:cNvSpPr txBox="1"/>
           <p:nvPr>
             <p:ph idx="12" type="sldNum"/>
@@ -12837,7 +12895,7 @@
       </p:sp>
       <p:sp>
         <p:nvSpPr>
-          <p:cNvPr id="215" name="Google Shape;215;p32"/>
+          <p:cNvPr id="216" name="Google Shape;216;p32"/>
           <p:cNvSpPr txBox="1"/>
           <p:nvPr>
             <p:ph idx="1" type="body"/>
@@ -12942,7 +13000,7 @@
   <p:cSld>
     <p:spTree>
       <p:nvGrpSpPr>
-        <p:cNvPr id="219" name="Shape 219"/>
+        <p:cNvPr id="220" name="Shape 220"/>
         <p:cNvGrpSpPr/>
         <p:nvPr/>
       </p:nvGrpSpPr>
@@ -12956,7 +13014,7 @@
       </p:grpSpPr>
       <p:sp>
         <p:nvSpPr>
-          <p:cNvPr id="220" name="Google Shape;220;p33"/>
+          <p:cNvPr id="221" name="Google Shape;221;p33"/>
           <p:cNvSpPr txBox="1"/>
           <p:nvPr>
             <p:ph type="title"/>
@@ -12996,7 +13054,7 @@
       </p:sp>
       <p:sp>
         <p:nvSpPr>
-          <p:cNvPr id="221" name="Google Shape;221;p33"/>
+          <p:cNvPr id="222" name="Google Shape;222;p33"/>
           <p:cNvSpPr txBox="1"/>
           <p:nvPr>
             <p:ph idx="1" type="body"/>
@@ -13179,7 +13237,7 @@
       </p:sp>
       <p:sp>
         <p:nvSpPr>
-          <p:cNvPr id="222" name="Google Shape;222;p33"/>
+          <p:cNvPr id="223" name="Google Shape;223;p33"/>
           <p:cNvSpPr txBox="1"/>
           <p:nvPr>
             <p:ph idx="12" type="sldNum"/>
@@ -13244,7 +13302,7 @@
       </p:sp>
       <p:graphicFrame>
         <p:nvGraphicFramePr>
-          <p:cNvPr id="223" name="Google Shape;223;p33"/>
+          <p:cNvPr id="224" name="Google Shape;224;p33"/>
           <p:cNvGraphicFramePr/>
           <p:nvPr/>
         </p:nvGraphicFramePr>
@@ -13257,7 +13315,7 @@
             <a:tbl>
               <a:tblPr>
                 <a:noFill/>
-                <a:tableStyleId>{5A5C42B2-62FC-432E-A5B2-011FD6E8263F}</a:tableStyleId>
+                <a:tableStyleId>{8EF02D17-2664-4761-85CA-2EE8B3B000EE}</a:tableStyleId>
               </a:tblPr>
               <a:tblGrid>
                 <a:gridCol w="2057400"/>
@@ -14308,7 +14366,7 @@
   <p:cSld>
     <p:spTree>
       <p:nvGrpSpPr>
-        <p:cNvPr id="227" name="Shape 227"/>
+        <p:cNvPr id="228" name="Shape 228"/>
         <p:cNvGrpSpPr/>
         <p:nvPr/>
       </p:nvGrpSpPr>
@@ -14322,7 +14380,7 @@
       </p:grpSpPr>
       <p:sp>
         <p:nvSpPr>
-          <p:cNvPr id="228" name="Google Shape;228;p34"/>
+          <p:cNvPr id="229" name="Google Shape;229;p34"/>
           <p:cNvSpPr txBox="1"/>
           <p:nvPr>
             <p:ph type="title"/>
@@ -14362,7 +14420,7 @@
       </p:sp>
       <p:sp>
         <p:nvSpPr>
-          <p:cNvPr id="229" name="Google Shape;229;p34"/>
+          <p:cNvPr id="230" name="Google Shape;230;p34"/>
           <p:cNvSpPr txBox="1"/>
           <p:nvPr>
             <p:ph idx="12" type="sldNum"/>
@@ -14427,7 +14485,7 @@
       </p:sp>
       <p:sp>
         <p:nvSpPr>
-          <p:cNvPr id="230" name="Google Shape;230;p34"/>
+          <p:cNvPr id="231" name="Google Shape;231;p34"/>
           <p:cNvSpPr txBox="1"/>
           <p:nvPr/>
         </p:nvSpPr>
@@ -14482,7 +14540,7 @@
       </p:sp>
       <p:pic>
         <p:nvPicPr>
-          <p:cNvPr id="231" name="Google Shape;231;p34"/>
+          <p:cNvPr id="232" name="Google Shape;232;p34"/>
           <p:cNvPicPr preferRelativeResize="0"/>
           <p:nvPr/>
         </p:nvPicPr>
@@ -14521,7 +14579,7 @@
   <p:cSld>
     <p:spTree>
       <p:nvGrpSpPr>
-        <p:cNvPr id="235" name="Shape 235"/>
+        <p:cNvPr id="236" name="Shape 236"/>
         <p:cNvGrpSpPr/>
         <p:nvPr/>
       </p:nvGrpSpPr>
@@ -14535,7 +14593,7 @@
       </p:grpSpPr>
       <p:sp>
         <p:nvSpPr>
-          <p:cNvPr id="236" name="Google Shape;236;p35"/>
+          <p:cNvPr id="237" name="Google Shape;237;p35"/>
           <p:cNvSpPr txBox="1"/>
           <p:nvPr>
             <p:ph type="title"/>
@@ -14575,7 +14633,7 @@
       </p:sp>
       <p:sp>
         <p:nvSpPr>
-          <p:cNvPr id="237" name="Google Shape;237;p35"/>
+          <p:cNvPr id="238" name="Google Shape;238;p35"/>
           <p:cNvSpPr txBox="1"/>
           <p:nvPr>
             <p:ph idx="1" type="body"/>
@@ -14607,7 +14665,7 @@
             </a:pPr>
             <a:r>
               <a:rPr b="1" lang="en"/>
-              <a:t>Product owner</a:t>
+              <a:t>Product owner #2</a:t>
             </a:r>
             <a:endParaRPr b="1"/>
           </a:p>
@@ -14681,7 +14739,7 @@
       </p:sp>
       <p:sp>
         <p:nvSpPr>
-          <p:cNvPr id="238" name="Google Shape;238;p35"/>
+          <p:cNvPr id="239" name="Google Shape;239;p35"/>
           <p:cNvSpPr txBox="1"/>
           <p:nvPr>
             <p:ph idx="12" type="sldNum"/>
@@ -14746,7 +14804,7 @@
       </p:sp>
       <p:pic>
         <p:nvPicPr>
-          <p:cNvPr id="239" name="Google Shape;239;p35"/>
+          <p:cNvPr id="240" name="Google Shape;240;p35"/>
           <p:cNvPicPr preferRelativeResize="0"/>
           <p:nvPr/>
         </p:nvPicPr>
@@ -14785,7 +14843,7 @@
   <p:cSld>
     <p:spTree>
       <p:nvGrpSpPr>
-        <p:cNvPr id="243" name="Shape 243"/>
+        <p:cNvPr id="244" name="Shape 244"/>
         <p:cNvGrpSpPr/>
         <p:nvPr/>
       </p:nvGrpSpPr>
@@ -14799,7 +14857,7 @@
       </p:grpSpPr>
       <p:sp>
         <p:nvSpPr>
-          <p:cNvPr id="244" name="Google Shape;244;p36"/>
+          <p:cNvPr id="245" name="Google Shape;245;p36"/>
           <p:cNvSpPr txBox="1"/>
           <p:nvPr>
             <p:ph type="title"/>
@@ -14839,7 +14897,7 @@
       </p:sp>
       <p:sp>
         <p:nvSpPr>
-          <p:cNvPr id="245" name="Google Shape;245;p36"/>
+          <p:cNvPr id="246" name="Google Shape;246;p36"/>
           <p:cNvSpPr txBox="1"/>
           <p:nvPr>
             <p:ph idx="1" type="body"/>
@@ -14930,7 +14988,7 @@
       </p:sp>
       <p:sp>
         <p:nvSpPr>
-          <p:cNvPr id="246" name="Google Shape;246;p36"/>
+          <p:cNvPr id="247" name="Google Shape;247;p36"/>
           <p:cNvSpPr txBox="1"/>
           <p:nvPr>
             <p:ph idx="12" type="sldNum"/>
@@ -15313,7 +15371,7 @@
   <p:cSld>
     <p:spTree>
       <p:nvGrpSpPr>
-        <p:cNvPr id="250" name="Shape 250"/>
+        <p:cNvPr id="251" name="Shape 251"/>
         <p:cNvGrpSpPr/>
         <p:nvPr/>
       </p:nvGrpSpPr>
@@ -15327,7 +15385,7 @@
       </p:grpSpPr>
       <p:sp>
         <p:nvSpPr>
-          <p:cNvPr id="251" name="Google Shape;251;p37"/>
+          <p:cNvPr id="252" name="Google Shape;252;p37"/>
           <p:cNvSpPr txBox="1"/>
           <p:nvPr>
             <p:ph type="title"/>
@@ -15367,7 +15425,7 @@
       </p:sp>
       <p:sp>
         <p:nvSpPr>
-          <p:cNvPr id="252" name="Google Shape;252;p37"/>
+          <p:cNvPr id="253" name="Google Shape;253;p37"/>
           <p:cNvSpPr txBox="1"/>
           <p:nvPr>
             <p:ph idx="1" type="body"/>
@@ -15441,7 +15499,7 @@
       </p:sp>
       <p:sp>
         <p:nvSpPr>
-          <p:cNvPr id="253" name="Google Shape;253;p37"/>
+          <p:cNvPr id="254" name="Google Shape;254;p37"/>
           <p:cNvSpPr txBox="1"/>
           <p:nvPr>
             <p:ph idx="12" type="sldNum"/>
@@ -15517,7 +15575,7 @@
   <p:cSld>
     <p:spTree>
       <p:nvGrpSpPr>
-        <p:cNvPr id="257" name="Shape 257"/>
+        <p:cNvPr id="258" name="Shape 258"/>
         <p:cNvGrpSpPr/>
         <p:nvPr/>
       </p:nvGrpSpPr>
@@ -15531,7 +15589,7 @@
       </p:grpSpPr>
       <p:sp>
         <p:nvSpPr>
-          <p:cNvPr id="258" name="Google Shape;258;p38"/>
+          <p:cNvPr id="259" name="Google Shape;259;p38"/>
           <p:cNvSpPr txBox="1"/>
           <p:nvPr>
             <p:ph type="title"/>
@@ -15571,7 +15629,7 @@
       </p:sp>
       <p:sp>
         <p:nvSpPr>
-          <p:cNvPr id="259" name="Google Shape;259;p38"/>
+          <p:cNvPr id="260" name="Google Shape;260;p38"/>
           <p:cNvSpPr txBox="1"/>
           <p:nvPr>
             <p:ph idx="12" type="sldNum"/>
@@ -15636,7 +15694,7 @@
       </p:sp>
       <p:graphicFrame>
         <p:nvGraphicFramePr>
-          <p:cNvPr id="260" name="Google Shape;260;p38"/>
+          <p:cNvPr id="261" name="Google Shape;261;p38"/>
           <p:cNvGraphicFramePr/>
           <p:nvPr/>
         </p:nvGraphicFramePr>
@@ -15649,7 +15707,7 @@
             <a:tbl>
               <a:tblPr>
                 <a:noFill/>
-                <a:tableStyleId>{5A5C42B2-62FC-432E-A5B2-011FD6E8263F}</a:tableStyleId>
+                <a:tableStyleId>{8EF02D17-2664-4761-85CA-2EE8B3B000EE}</a:tableStyleId>
               </a:tblPr>
               <a:tblGrid>
                 <a:gridCol w="638675"/>
@@ -17025,7 +17083,7 @@
   <p:cSld>
     <p:spTree>
       <p:nvGrpSpPr>
-        <p:cNvPr id="264" name="Shape 264"/>
+        <p:cNvPr id="265" name="Shape 265"/>
         <p:cNvGrpSpPr/>
         <p:nvPr/>
       </p:nvGrpSpPr>
@@ -17039,7 +17097,7 @@
       </p:grpSpPr>
       <p:sp>
         <p:nvSpPr>
-          <p:cNvPr id="265" name="Google Shape;265;p39"/>
+          <p:cNvPr id="266" name="Google Shape;266;p39"/>
           <p:cNvSpPr txBox="1"/>
           <p:nvPr>
             <p:ph type="title"/>
@@ -17094,7 +17152,7 @@
   <p:cSld>
     <p:spTree>
       <p:nvGrpSpPr>
-        <p:cNvPr id="269" name="Shape 269"/>
+        <p:cNvPr id="270" name="Shape 270"/>
         <p:cNvGrpSpPr/>
         <p:nvPr/>
       </p:nvGrpSpPr>
@@ -17108,7 +17166,7 @@
       </p:grpSpPr>
       <p:sp>
         <p:nvSpPr>
-          <p:cNvPr id="270" name="Google Shape;270;p40"/>
+          <p:cNvPr id="271" name="Google Shape;271;p40"/>
           <p:cNvSpPr txBox="1"/>
           <p:nvPr>
             <p:ph type="title"/>
@@ -17148,7 +17206,7 @@
       </p:sp>
       <p:sp>
         <p:nvSpPr>
-          <p:cNvPr id="271" name="Google Shape;271;p40"/>
+          <p:cNvPr id="272" name="Google Shape;272;p40"/>
           <p:cNvSpPr txBox="1"/>
           <p:nvPr>
             <p:ph idx="1" type="body"/>
@@ -17294,7 +17352,7 @@
       </p:sp>
       <p:sp>
         <p:nvSpPr>
-          <p:cNvPr id="272" name="Google Shape;272;p40"/>
+          <p:cNvPr id="273" name="Google Shape;273;p40"/>
           <p:cNvSpPr txBox="1"/>
           <p:nvPr>
             <p:ph idx="12" type="sldNum"/>
@@ -17359,7 +17417,7 @@
       </p:sp>
       <p:sp>
         <p:nvSpPr>
-          <p:cNvPr id="273" name="Google Shape;273;p40"/>
+          <p:cNvPr id="274" name="Google Shape;274;p40"/>
           <p:cNvSpPr txBox="1"/>
           <p:nvPr/>
         </p:nvSpPr>
@@ -17412,7 +17470,7 @@
   <p:cSld>
     <p:spTree>
       <p:nvGrpSpPr>
-        <p:cNvPr id="277" name="Shape 277"/>
+        <p:cNvPr id="278" name="Shape 278"/>
         <p:cNvGrpSpPr/>
         <p:nvPr/>
       </p:nvGrpSpPr>
@@ -17426,7 +17484,7 @@
       </p:grpSpPr>
       <p:sp>
         <p:nvSpPr>
-          <p:cNvPr id="278" name="Google Shape;278;p41"/>
+          <p:cNvPr id="279" name="Google Shape;279;p41"/>
           <p:cNvSpPr txBox="1"/>
           <p:nvPr>
             <p:ph type="title"/>
@@ -17466,7 +17524,7 @@
       </p:sp>
       <p:sp>
         <p:nvSpPr>
-          <p:cNvPr id="279" name="Google Shape;279;p41"/>
+          <p:cNvPr id="280" name="Google Shape;280;p41"/>
           <p:cNvSpPr txBox="1"/>
           <p:nvPr>
             <p:ph idx="1" type="body"/>
@@ -17506,7 +17564,7 @@
       </p:sp>
       <p:sp>
         <p:nvSpPr>
-          <p:cNvPr id="280" name="Google Shape;280;p41"/>
+          <p:cNvPr id="281" name="Google Shape;281;p41"/>
           <p:cNvSpPr txBox="1"/>
           <p:nvPr>
             <p:ph idx="12" type="sldNum"/>
@@ -17571,7 +17629,7 @@
       </p:sp>
       <p:graphicFrame>
         <p:nvGraphicFramePr>
-          <p:cNvPr id="281" name="Google Shape;281;p41"/>
+          <p:cNvPr id="282" name="Google Shape;282;p41"/>
           <p:cNvGraphicFramePr/>
           <p:nvPr/>
         </p:nvGraphicFramePr>
@@ -17584,7 +17642,7 @@
             <a:tbl>
               <a:tblPr>
                 <a:noFill/>
-                <a:tableStyleId>{5A5C42B2-62FC-432E-A5B2-011FD6E8263F}</a:tableStyleId>
+                <a:tableStyleId>{8EF02D17-2664-4761-85CA-2EE8B3B000EE}</a:tableStyleId>
               </a:tblPr>
               <a:tblGrid>
                 <a:gridCol w="1280725"/>
@@ -18778,7 +18836,7 @@
   <p:cSld>
     <p:spTree>
       <p:nvGrpSpPr>
-        <p:cNvPr id="285" name="Shape 285"/>
+        <p:cNvPr id="286" name="Shape 286"/>
         <p:cNvGrpSpPr/>
         <p:nvPr/>
       </p:nvGrpSpPr>
@@ -18792,7 +18850,7 @@
       </p:grpSpPr>
       <p:sp>
         <p:nvSpPr>
-          <p:cNvPr id="286" name="Google Shape;286;p42"/>
+          <p:cNvPr id="287" name="Google Shape;287;p42"/>
           <p:cNvSpPr txBox="1"/>
           <p:nvPr>
             <p:ph type="title"/>
@@ -18832,7 +18890,7 @@
       </p:sp>
       <p:sp>
         <p:nvSpPr>
-          <p:cNvPr id="287" name="Google Shape;287;p42"/>
+          <p:cNvPr id="288" name="Google Shape;288;p42"/>
           <p:cNvSpPr txBox="1"/>
           <p:nvPr>
             <p:ph idx="1" type="body"/>
@@ -18921,7 +18979,7 @@
       </p:sp>
       <p:sp>
         <p:nvSpPr>
-          <p:cNvPr id="288" name="Google Shape;288;p42"/>
+          <p:cNvPr id="289" name="Google Shape;289;p42"/>
           <p:cNvSpPr txBox="1"/>
           <p:nvPr>
             <p:ph idx="12" type="sldNum"/>
@@ -18997,7 +19055,7 @@
   <p:cSld>
     <p:spTree>
       <p:nvGrpSpPr>
-        <p:cNvPr id="292" name="Shape 292"/>
+        <p:cNvPr id="293" name="Shape 293"/>
         <p:cNvGrpSpPr/>
         <p:nvPr/>
       </p:nvGrpSpPr>
@@ -19011,7 +19069,7 @@
       </p:grpSpPr>
       <p:sp>
         <p:nvSpPr>
-          <p:cNvPr id="293" name="Google Shape;293;p43"/>
+          <p:cNvPr id="294" name="Google Shape;294;p43"/>
           <p:cNvSpPr txBox="1"/>
           <p:nvPr>
             <p:ph type="title"/>
@@ -19062,7 +19120,7 @@
   <p:cSld>
     <p:spTree>
       <p:nvGrpSpPr>
-        <p:cNvPr id="297" name="Shape 297"/>
+        <p:cNvPr id="298" name="Shape 298"/>
         <p:cNvGrpSpPr/>
         <p:nvPr/>
       </p:nvGrpSpPr>
@@ -19076,7 +19134,7 @@
       </p:grpSpPr>
       <p:sp>
         <p:nvSpPr>
-          <p:cNvPr id="298" name="Google Shape;298;p44"/>
+          <p:cNvPr id="299" name="Google Shape;299;p44"/>
           <p:cNvSpPr txBox="1"/>
           <p:nvPr>
             <p:ph type="title"/>
@@ -19116,7 +19174,7 @@
       </p:sp>
       <p:sp>
         <p:nvSpPr>
-          <p:cNvPr id="299" name="Google Shape;299;p44"/>
+          <p:cNvPr id="300" name="Google Shape;300;p44"/>
           <p:cNvSpPr txBox="1"/>
           <p:nvPr>
             <p:ph idx="1" type="body"/>
@@ -19290,7 +19348,7 @@
       </p:sp>
       <p:sp>
         <p:nvSpPr>
-          <p:cNvPr id="300" name="Google Shape;300;p44"/>
+          <p:cNvPr id="301" name="Google Shape;301;p44"/>
           <p:cNvSpPr txBox="1"/>
           <p:nvPr>
             <p:ph idx="12" type="sldNum"/>
@@ -19366,7 +19424,7 @@
   <p:cSld>
     <p:spTree>
       <p:nvGrpSpPr>
-        <p:cNvPr id="304" name="Shape 304"/>
+        <p:cNvPr id="305" name="Shape 305"/>
         <p:cNvGrpSpPr/>
         <p:nvPr/>
       </p:nvGrpSpPr>
@@ -19380,7 +19438,7 @@
       </p:grpSpPr>
       <p:sp>
         <p:nvSpPr>
-          <p:cNvPr id="305" name="Google Shape;305;p45"/>
+          <p:cNvPr id="306" name="Google Shape;306;p45"/>
           <p:cNvSpPr txBox="1"/>
           <p:nvPr>
             <p:ph type="title"/>
@@ -19420,7 +19478,7 @@
       </p:sp>
       <p:sp>
         <p:nvSpPr>
-          <p:cNvPr id="306" name="Google Shape;306;p45"/>
+          <p:cNvPr id="307" name="Google Shape;307;p45"/>
           <p:cNvSpPr txBox="1"/>
           <p:nvPr>
             <p:ph idx="12" type="sldNum"/>
@@ -19485,7 +19543,7 @@
       </p:sp>
       <p:pic>
         <p:nvPicPr>
-          <p:cNvPr id="307" name="Google Shape;307;p45"/>
+          <p:cNvPr id="308" name="Google Shape;308;p45"/>
           <p:cNvPicPr preferRelativeResize="0"/>
           <p:nvPr/>
         </p:nvPicPr>
@@ -19524,7 +19582,7 @@
   <p:cSld>
     <p:spTree>
       <p:nvGrpSpPr>
-        <p:cNvPr id="311" name="Shape 311"/>
+        <p:cNvPr id="312" name="Shape 312"/>
         <p:cNvGrpSpPr/>
         <p:nvPr/>
       </p:nvGrpSpPr>
@@ -19538,7 +19596,7 @@
       </p:grpSpPr>
       <p:sp>
         <p:nvSpPr>
-          <p:cNvPr id="312" name="Google Shape;312;p46"/>
+          <p:cNvPr id="313" name="Google Shape;313;p46"/>
           <p:cNvSpPr txBox="1"/>
           <p:nvPr>
             <p:ph type="title"/>
@@ -19578,7 +19636,7 @@
       </p:sp>
       <p:sp>
         <p:nvSpPr>
-          <p:cNvPr id="313" name="Google Shape;313;p46"/>
+          <p:cNvPr id="314" name="Google Shape;314;p46"/>
           <p:cNvSpPr txBox="1"/>
           <p:nvPr>
             <p:ph idx="1" type="body"/>
@@ -19700,7 +19758,7 @@
       </p:sp>
       <p:sp>
         <p:nvSpPr>
-          <p:cNvPr id="314" name="Google Shape;314;p46"/>
+          <p:cNvPr id="315" name="Google Shape;315;p46"/>
           <p:cNvSpPr txBox="1"/>
           <p:nvPr>
             <p:ph idx="12" type="sldNum"/>
@@ -19841,7 +19899,7 @@
   <p:cSld>
     <p:spTree>
       <p:nvGrpSpPr>
-        <p:cNvPr id="318" name="Shape 318"/>
+        <p:cNvPr id="319" name="Shape 319"/>
         <p:cNvGrpSpPr/>
         <p:nvPr/>
       </p:nvGrpSpPr>
@@ -19855,7 +19913,7 @@
       </p:grpSpPr>
       <p:sp>
         <p:nvSpPr>
-          <p:cNvPr id="319" name="Google Shape;319;p47"/>
+          <p:cNvPr id="320" name="Google Shape;320;p47"/>
           <p:cNvSpPr txBox="1"/>
           <p:nvPr>
             <p:ph type="title"/>
@@ -19895,7 +19953,7 @@
       </p:sp>
       <p:sp>
         <p:nvSpPr>
-          <p:cNvPr id="320" name="Google Shape;320;p47"/>
+          <p:cNvPr id="321" name="Google Shape;321;p47"/>
           <p:cNvSpPr txBox="1"/>
           <p:nvPr>
             <p:ph idx="1" type="body"/>
@@ -20072,7 +20130,7 @@
       </p:sp>
       <p:sp>
         <p:nvSpPr>
-          <p:cNvPr id="321" name="Google Shape;321;p47"/>
+          <p:cNvPr id="322" name="Google Shape;322;p47"/>
           <p:cNvSpPr txBox="1"/>
           <p:nvPr>
             <p:ph idx="12" type="sldNum"/>
@@ -20148,7 +20206,7 @@
   <p:cSld>
     <p:spTree>
       <p:nvGrpSpPr>
-        <p:cNvPr id="325" name="Shape 325"/>
+        <p:cNvPr id="326" name="Shape 326"/>
         <p:cNvGrpSpPr/>
         <p:nvPr/>
       </p:nvGrpSpPr>
@@ -20162,7 +20220,7 @@
       </p:grpSpPr>
       <p:sp>
         <p:nvSpPr>
-          <p:cNvPr id="326" name="Google Shape;326;p48"/>
+          <p:cNvPr id="327" name="Google Shape;327;p48"/>
           <p:cNvSpPr txBox="1"/>
           <p:nvPr>
             <p:ph type="ctrTitle"/>
@@ -20202,7 +20260,7 @@
       </p:sp>
       <p:sp>
         <p:nvSpPr>
-          <p:cNvPr id="327" name="Google Shape;327;p48"/>
+          <p:cNvPr id="328" name="Google Shape;328;p48"/>
           <p:cNvSpPr txBox="1"/>
           <p:nvPr>
             <p:ph idx="1" type="subTitle"/>
@@ -20332,7 +20390,7 @@
   <p:cSld>
     <p:spTree>
       <p:nvGrpSpPr>
-        <p:cNvPr id="331" name="Shape 331"/>
+        <p:cNvPr id="332" name="Shape 332"/>
         <p:cNvGrpSpPr/>
         <p:nvPr/>
       </p:nvGrpSpPr>
@@ -20346,7 +20404,7 @@
       </p:grpSpPr>
       <p:sp>
         <p:nvSpPr>
-          <p:cNvPr id="332" name="Google Shape;332;p49"/>
+          <p:cNvPr id="333" name="Google Shape;333;p49"/>
           <p:cNvSpPr txBox="1"/>
           <p:nvPr>
             <p:ph type="title"/>
@@ -20386,7 +20444,7 @@
       </p:sp>
       <p:sp>
         <p:nvSpPr>
-          <p:cNvPr id="333" name="Google Shape;333;p49"/>
+          <p:cNvPr id="334" name="Google Shape;334;p49"/>
           <p:cNvSpPr txBox="1"/>
           <p:nvPr>
             <p:ph idx="12" type="sldNum"/>
@@ -20451,7 +20509,7 @@
       </p:sp>
       <p:sp>
         <p:nvSpPr>
-          <p:cNvPr id="334" name="Google Shape;334;p49"/>
+          <p:cNvPr id="335" name="Google Shape;335;p49"/>
           <p:cNvSpPr txBox="1"/>
           <p:nvPr>
             <p:ph idx="1" type="body"/>

</xml_diff>

<commit_message>
Updates for winter 2025-26
</commit_message>
<xml_diff>
--- a/Lecture slides/AMOS B02 - Scrum and AMOS.pptx
+++ b/Lecture slides/AMOS B02 - Scrum and AMOS.pptx
@@ -14174,11 +14174,11 @@
             <a:tbl>
               <a:tblPr>
                 <a:noFill/>
-                <a:tableStyleId>{87DC84E8-2E41-46D6-8290-F3E412BB11F4}</a:tableStyleId>
+                <a:tableStyleId>{ACD05F4B-F717-41A4-BDE8-8485AB1F8521}</a:tableStyleId>
               </a:tblPr>
               <a:tblGrid>
-                <a:gridCol w="2057400"/>
-                <a:gridCol w="2057400"/>
+                <a:gridCol w="2103125"/>
+                <a:gridCol w="2103125"/>
               </a:tblGrid>
               <a:tr h="457200">
                 <a:tc>
@@ -16601,7 +16601,7 @@
             <a:tbl>
               <a:tblPr>
                 <a:noFill/>
-                <a:tableStyleId>{87DC84E8-2E41-46D6-8290-F3E412BB11F4}</a:tableStyleId>
+                <a:tableStyleId>{ACD05F4B-F717-41A4-BDE8-8485AB1F8521}</a:tableStyleId>
               </a:tblPr>
               <a:tblGrid>
                 <a:gridCol w="638675"/>
@@ -18552,7 +18552,7 @@
             <a:tbl>
               <a:tblPr>
                 <a:noFill/>
-                <a:tableStyleId>{87DC84E8-2E41-46D6-8290-F3E412BB11F4}</a:tableStyleId>
+                <a:tableStyleId>{ACD05F4B-F717-41A4-BDE8-8485AB1F8521}</a:tableStyleId>
               </a:tblPr>
               <a:tblGrid>
                 <a:gridCol w="1280725"/>

</xml_diff>